<commit_message>
Update design pattern slides
</commit_message>
<xml_diff>
--- a/00.Design_Pattern/Adapter_Pattern.pptx
+++ b/00.Design_Pattern/Adapter_Pattern.pptx
@@ -5,10 +5,10 @@
     <p:sldMasterId id="2147483660" r:id="rId1"/>
   </p:sldMasterIdLst>
   <p:notesMasterIdLst>
-    <p:notesMasterId r:id="rId19"/>
+    <p:notesMasterId r:id="rId20"/>
   </p:notesMasterIdLst>
   <p:handoutMasterIdLst>
-    <p:handoutMasterId r:id="rId20"/>
+    <p:handoutMasterId r:id="rId21"/>
   </p:handoutMasterIdLst>
   <p:sldIdLst>
     <p:sldId id="256" r:id="rId2"/>
@@ -27,7 +27,8 @@
     <p:sldId id="274" r:id="rId15"/>
     <p:sldId id="275" r:id="rId16"/>
     <p:sldId id="269" r:id="rId17"/>
-    <p:sldId id="262" r:id="rId18"/>
+    <p:sldId id="277" r:id="rId18"/>
+    <p:sldId id="262" r:id="rId19"/>
   </p:sldIdLst>
   <p:sldSz cx="9144000" cy="6858000" type="screen4x3"/>
   <p:notesSz cx="7315200" cy="9601200"/>
@@ -219,7 +220,7 @@
           <a:p>
             <a:fld id="{2A5CE4C1-ED51-48CD-B71C-CB491FD0472C}" type="datetimeFigureOut">
               <a:rPr lang="en-US" smtClean="0"/>
-              <a:t>10/10/2017</a:t>
+              <a:t>10/11/2017</a:t>
             </a:fld>
             <a:endParaRPr lang="en-US"/>
           </a:p>
@@ -384,7 +385,7 @@
           <a:p>
             <a:fld id="{45E700F6-5DE9-4EA4-BCDA-63361F47789C}" type="datetimeFigureOut">
               <a:rPr lang="en-US" smtClean="0"/>
-              <a:t>10/10/2017</a:t>
+              <a:t>10/11/2017</a:t>
             </a:fld>
             <a:endParaRPr lang="en-US"/>
           </a:p>
@@ -3677,11 +3678,7 @@
           <a:p>
             <a:r>
               <a:rPr lang="en-US" dirty="0" smtClean="0"/>
-              <a:t>Hanoi, </a:t>
-            </a:r>
-            <a:r>
-              <a:rPr lang="en-US" dirty="0" smtClean="0"/>
-              <a:t>October 2017</a:t>
+              <a:t>Hanoi, October 2017</a:t>
             </a:r>
             <a:endParaRPr lang="en-US" dirty="0"/>
           </a:p>
@@ -4500,15 +4497,7 @@
             <a:pPr lvl="1"/>
             <a:r>
               <a:rPr lang="en-US" dirty="0" smtClean="0"/>
-              <a:t>Need to specify all parameters (the part for </a:t>
-            </a:r>
-            <a:r>
-              <a:rPr lang="en-US" dirty="0" smtClean="0"/>
-              <a:t>our </a:t>
-            </a:r>
-            <a:r>
-              <a:rPr lang="en-US" dirty="0" smtClean="0"/>
-              <a:t>adapter and the part for class </a:t>
+              <a:t>Need to specify all parameters (the part for our adapter and the part for class </a:t>
             </a:r>
             <a:r>
               <a:rPr lang="en-US" dirty="0" err="1" smtClean="0"/>
@@ -4662,9 +4651,32 @@
             <a:pPr lvl="1"/>
             <a:r>
               <a:rPr lang="en-US" dirty="0" smtClean="0"/>
-              <a:t>Doesn’t alter the interface, but adds responsibility</a:t>
-            </a:r>
+              <a:t>Doesn’t alter the interface, but adds </a:t>
+            </a:r>
+            <a:r>
+              <a:rPr lang="en-US" dirty="0" smtClean="0"/>
+              <a:t>responsibilities</a:t>
+            </a:r>
+          </a:p>
+          <a:p>
+            <a:endParaRPr lang="en-US" dirty="0"/>
+          </a:p>
+          <a:p>
             <a:endParaRPr lang="en-US" dirty="0" smtClean="0"/>
+          </a:p>
+          <a:p>
+            <a:r>
+              <a:rPr lang="en-US" dirty="0" smtClean="0"/>
+              <a:t>Façade</a:t>
+            </a:r>
+          </a:p>
+          <a:p>
+            <a:pPr lvl="1"/>
+            <a:r>
+              <a:rPr lang="en-US" dirty="0" smtClean="0"/>
+              <a:t>Make an interface simpler</a:t>
+            </a:r>
+            <a:endParaRPr lang="en-US" dirty="0"/>
           </a:p>
         </p:txBody>
       </p:sp>
@@ -4759,7 +4771,7 @@
             </a:r>
             <a:r>
               <a:rPr lang="en-US" dirty="0" err="1" smtClean="0"/>
-              <a:t>LibHMIAdapter</a:t>
+              <a:t>DisplayingCallbackBridge</a:t>
             </a:r>
             <a:endParaRPr lang="en-US" dirty="0"/>
           </a:p>
@@ -4784,33 +4796,46 @@
           <a:p>
             <a:r>
               <a:rPr lang="en-US" dirty="0" smtClean="0"/>
-              <a:t>A Middleman between </a:t>
+              <a:t>Provides method </a:t>
             </a:r>
             <a:r>
               <a:rPr lang="en-US" dirty="0" err="1" smtClean="0"/>
-              <a:t>Qt</a:t>
-            </a:r>
-            <a:r>
-              <a:rPr lang="en-US" dirty="0" smtClean="0"/>
-              <a:t>/IPC and Model classes</a:t>
-            </a:r>
+              <a:t>DisplayOverlay</a:t>
+            </a:r>
+            <a:r>
+              <a:rPr lang="en-US" dirty="0" smtClean="0"/>
+              <a:t>(), </a:t>
+            </a:r>
+            <a:r>
+              <a:rPr lang="en-US" dirty="0" err="1" smtClean="0"/>
+              <a:t>DisplayScreen</a:t>
+            </a:r>
+            <a:r>
+              <a:rPr lang="en-US" dirty="0" smtClean="0"/>
+              <a:t>()</a:t>
+            </a:r>
+            <a:endParaRPr lang="en-US" dirty="0" smtClean="0"/>
           </a:p>
           <a:p>
             <a:pPr lvl="1"/>
             <a:r>
-              <a:rPr lang="en-US" dirty="0"/>
-              <a:t>W</a:t>
-            </a:r>
-            <a:r>
-              <a:rPr lang="en-US" dirty="0" smtClean="0"/>
-              <a:t>orks like a normal middle class</a:t>
+              <a:rPr lang="en-US" dirty="0" smtClean="0"/>
+              <a:t>Client: Components</a:t>
             </a:r>
           </a:p>
           <a:p>
             <a:pPr lvl="1"/>
             <a:r>
-              <a:rPr lang="en-US" dirty="0" smtClean="0"/>
-              <a:t>Does not convert interface at all</a:t>
+              <a:rPr lang="en-US" dirty="0" err="1" smtClean="0"/>
+              <a:t>Adaptee</a:t>
+            </a:r>
+            <a:r>
+              <a:rPr lang="en-US" dirty="0" smtClean="0"/>
+              <a:t>: </a:t>
+            </a:r>
+            <a:r>
+              <a:rPr lang="en-US" dirty="0" err="1" smtClean="0"/>
+              <a:t>DisplayOverlayManager</a:t>
             </a:r>
             <a:endParaRPr lang="en-US" dirty="0" smtClean="0"/>
           </a:p>
@@ -4851,7 +4876,7 @@
       </p:sp>
       <p:pic>
         <p:nvPicPr>
-          <p:cNvPr id="5" name="Picture 4"/>
+          <p:cNvPr id="6" name="Picture 5"/>
           <p:cNvPicPr>
             <a:picLocks noChangeAspect="1"/>
           </p:cNvPicPr>
@@ -4865,8 +4890,8 @@
         </p:blipFill>
         <p:spPr>
           <a:xfrm>
-            <a:off x="1340908" y="2420405"/>
-            <a:ext cx="6515100" cy="3686175"/>
+            <a:off x="321733" y="2410443"/>
+            <a:ext cx="8582025" cy="3390900"/>
           </a:xfrm>
           <a:prstGeom prst="rect">
             <a:avLst/>
@@ -4910,6 +4935,215 @@
           <a:chExt cx="0" cy="0"/>
         </a:xfrm>
       </p:grpSpPr>
+      <p:sp>
+        <p:nvSpPr>
+          <p:cNvPr id="2" name="Title 1"/>
+          <p:cNvSpPr>
+            <a:spLocks noGrp="1"/>
+          </p:cNvSpPr>
+          <p:nvPr>
+            <p:ph type="title"/>
+          </p:nvPr>
+        </p:nvSpPr>
+        <p:spPr/>
+        <p:txBody>
+          <a:bodyPr/>
+          <a:lstStyle/>
+          <a:p>
+            <a:r>
+              <a:rPr lang="en-US" dirty="0" smtClean="0"/>
+              <a:t>INFO3.5 - Class </a:t>
+            </a:r>
+            <a:r>
+              <a:rPr lang="en-US" dirty="0" err="1" smtClean="0"/>
+              <a:t>LibHMIAdapter</a:t>
+            </a:r>
+            <a:endParaRPr lang="en-US" dirty="0"/>
+          </a:p>
+        </p:txBody>
+      </p:sp>
+      <p:sp>
+        <p:nvSpPr>
+          <p:cNvPr id="3" name="Content Placeholder 2"/>
+          <p:cNvSpPr>
+            <a:spLocks noGrp="1"/>
+          </p:cNvSpPr>
+          <p:nvPr>
+            <p:ph idx="1"/>
+          </p:nvPr>
+        </p:nvSpPr>
+        <p:spPr/>
+        <p:txBody>
+          <a:bodyPr>
+            <a:normAutofit/>
+          </a:bodyPr>
+          <a:lstStyle/>
+          <a:p>
+            <a:r>
+              <a:rPr lang="en-US" dirty="0" smtClean="0"/>
+              <a:t>A Middleman between </a:t>
+            </a:r>
+            <a:r>
+              <a:rPr lang="en-US" dirty="0" err="1" smtClean="0"/>
+              <a:t>Qt</a:t>
+            </a:r>
+            <a:r>
+              <a:rPr lang="en-US" dirty="0" smtClean="0"/>
+              <a:t>/IPC and Model classes</a:t>
+            </a:r>
+          </a:p>
+          <a:p>
+            <a:pPr lvl="1"/>
+            <a:r>
+              <a:rPr lang="en-US" dirty="0"/>
+              <a:t>W</a:t>
+            </a:r>
+            <a:r>
+              <a:rPr lang="en-US" dirty="0" smtClean="0"/>
+              <a:t>orks like a normal middle class</a:t>
+            </a:r>
+          </a:p>
+          <a:p>
+            <a:pPr lvl="1"/>
+            <a:r>
+              <a:rPr lang="en-US" dirty="0" smtClean="0"/>
+              <a:t>Does not convert interface at all</a:t>
+            </a:r>
+          </a:p>
+        </p:txBody>
+      </p:sp>
+      <p:sp>
+        <p:nvSpPr>
+          <p:cNvPr id="4" name="Slide Number Placeholder 3"/>
+          <p:cNvSpPr>
+            <a:spLocks noGrp="1"/>
+          </p:cNvSpPr>
+          <p:nvPr>
+            <p:ph type="sldNum" sz="quarter" idx="4294967295"/>
+          </p:nvPr>
+        </p:nvSpPr>
+        <p:spPr>
+          <a:xfrm>
+            <a:off x="3543300" y="6362702"/>
+            <a:ext cx="2057400" cy="365125"/>
+          </a:xfrm>
+          <a:prstGeom prst="rect">
+            <a:avLst/>
+          </a:prstGeom>
+        </p:spPr>
+        <p:txBody>
+          <a:bodyPr/>
+          <a:lstStyle/>
+          <a:p>
+            <a:pPr algn="ctr"/>
+            <a:fld id="{5C03935C-2762-48BD-B3C3-99E6B4611AE1}" type="slidenum">
+              <a:rPr lang="en-US" smtClean="0"/>
+              <a:pPr algn="ctr"/>
+              <a:t>17</a:t>
+            </a:fld>
+            <a:endParaRPr lang="en-US" dirty="0"/>
+          </a:p>
+        </p:txBody>
+      </p:sp>
+      <p:pic>
+        <p:nvPicPr>
+          <p:cNvPr id="5" name="Picture 4"/>
+          <p:cNvPicPr>
+            <a:picLocks noChangeAspect="1"/>
+          </p:cNvPicPr>
+          <p:nvPr/>
+        </p:nvPicPr>
+        <p:blipFill>
+          <a:blip r:embed="rId2"/>
+          <a:stretch>
+            <a:fillRect/>
+          </a:stretch>
+        </p:blipFill>
+        <p:spPr>
+          <a:xfrm>
+            <a:off x="1340908" y="2420405"/>
+            <a:ext cx="6515100" cy="3686175"/>
+          </a:xfrm>
+          <a:prstGeom prst="rect">
+            <a:avLst/>
+          </a:prstGeom>
+        </p:spPr>
+      </p:pic>
+      <p:sp>
+        <p:nvSpPr>
+          <p:cNvPr id="6" name="TextBox 5"/>
+          <p:cNvSpPr txBox="1"/>
+          <p:nvPr/>
+        </p:nvSpPr>
+        <p:spPr>
+          <a:xfrm>
+            <a:off x="4904510" y="2326760"/>
+            <a:ext cx="3752602" cy="523220"/>
+          </a:xfrm>
+          <a:prstGeom prst="rect">
+            <a:avLst/>
+          </a:prstGeom>
+          <a:noFill/>
+        </p:spPr>
+        <p:txBody>
+          <a:bodyPr wrap="square" rtlCol="0">
+            <a:spAutoFit/>
+          </a:bodyPr>
+          <a:lstStyle/>
+          <a:p>
+            <a:r>
+              <a:rPr lang="en-US" sz="2800" dirty="0" smtClean="0">
+                <a:solidFill>
+                  <a:srgbClr val="FF0000"/>
+                </a:solidFill>
+              </a:rPr>
+              <a:t>Look like Façade Pattern</a:t>
+            </a:r>
+            <a:endParaRPr lang="en-US" sz="2800" dirty="0">
+              <a:solidFill>
+                <a:srgbClr val="FF0000"/>
+              </a:solidFill>
+            </a:endParaRPr>
+          </a:p>
+        </p:txBody>
+      </p:sp>
+    </p:spTree>
+    <p:extLst>
+      <p:ext uri="{BB962C8B-B14F-4D97-AF65-F5344CB8AC3E}">
+        <p14:creationId xmlns:p14="http://schemas.microsoft.com/office/powerpoint/2010/main" val="4117976894"/>
+      </p:ext>
+    </p:extLst>
+  </p:cSld>
+  <p:clrMapOvr>
+    <a:masterClrMapping/>
+  </p:clrMapOvr>
+  <p:timing>
+    <p:tnLst>
+      <p:par>
+        <p:cTn id="1" dur="indefinite" restart="never" nodeType="tmRoot"/>
+      </p:par>
+    </p:tnLst>
+  </p:timing>
+</p:sld>
+</file>
+
+<file path=ppt/slides/slide18.xml><?xml version="1.0" encoding="utf-8"?>
+<p:sld xmlns:a="http://schemas.openxmlformats.org/drawingml/2006/main" xmlns:r="http://schemas.openxmlformats.org/officeDocument/2006/relationships" xmlns:p="http://schemas.openxmlformats.org/presentationml/2006/main">
+  <p:cSld>
+    <p:spTree>
+      <p:nvGrpSpPr>
+        <p:cNvPr id="1" name=""/>
+        <p:cNvGrpSpPr/>
+        <p:nvPr/>
+      </p:nvGrpSpPr>
+      <p:grpSpPr>
+        <a:xfrm>
+          <a:off x="0" y="0"/>
+          <a:ext cx="0" cy="0"/>
+          <a:chOff x="0" y="0"/>
+          <a:chExt cx="0" cy="0"/>
+        </a:xfrm>
+      </p:grpSpPr>
       <p:pic>
         <p:nvPicPr>
           <p:cNvPr id="4" name="Picture 3"/>
@@ -4967,7 +5201,7 @@
             <a:fld id="{5C03935C-2762-48BD-B3C3-99E6B4611AE1}" type="slidenum">
               <a:rPr lang="en-US" smtClean="0"/>
               <a:pPr algn="ctr"/>
-              <a:t>17</a:t>
+              <a:t>18</a:t>
             </a:fld>
             <a:endParaRPr lang="en-US" dirty="0"/>
           </a:p>
@@ -5058,14 +5292,37 @@
           <a:p>
             <a:r>
               <a:rPr lang="en-US" dirty="0" smtClean="0"/>
-              <a:t>Implementation</a:t>
-            </a:r>
-          </a:p>
-          <a:p>
-            <a:r>
-              <a:rPr lang="en-US" dirty="0" smtClean="0"/>
-              <a:t>Summary</a:t>
-            </a:r>
+              <a:t>Example: Object Adapter</a:t>
+            </a:r>
+          </a:p>
+          <a:p>
+            <a:r>
+              <a:rPr lang="en-US" dirty="0" smtClean="0"/>
+              <a:t>Example: Class Adapter</a:t>
+            </a:r>
+          </a:p>
+          <a:p>
+            <a:r>
+              <a:rPr lang="en-US" dirty="0" smtClean="0"/>
+              <a:t>INFO3.5L </a:t>
+            </a:r>
+            <a:r>
+              <a:rPr lang="en-US" dirty="0"/>
+              <a:t>A</a:t>
+            </a:r>
+            <a:r>
+              <a:rPr lang="en-US" dirty="0" smtClean="0"/>
+              <a:t>daptive </a:t>
+            </a:r>
+            <a:r>
+              <a:rPr lang="en-US" dirty="0"/>
+              <a:t>C</a:t>
+            </a:r>
+            <a:r>
+              <a:rPr lang="en-US" dirty="0" smtClean="0"/>
+              <a:t>lasses</a:t>
+            </a:r>
+            <a:endParaRPr lang="en-US" dirty="0" smtClean="0"/>
           </a:p>
         </p:txBody>
       </p:sp>
@@ -5345,7 +5602,6 @@
               <a:rPr lang="en-US" dirty="0" smtClean="0"/>
               <a:t>You can write an adapter class that acts as a middleman</a:t>
             </a:r>
-            <a:endParaRPr lang="en-US" dirty="0" smtClean="0"/>
           </a:p>
         </p:txBody>
       </p:sp>
@@ -5508,7 +5764,6 @@
               <a:rPr lang="en-US" dirty="0" smtClean="0"/>
               <a:t>Need multiple inheritance to implement it, which isn’t possible in Java</a:t>
             </a:r>
-            <a:endParaRPr lang="en-US" dirty="0" smtClean="0"/>
           </a:p>
           <a:p>
             <a:endParaRPr lang="en-US" dirty="0" smtClean="0"/>
@@ -5681,7 +5936,6 @@
               <a:rPr lang="en-US" dirty="0" smtClean="0"/>
               <a:t>(Duck*) working with Duck object</a:t>
             </a:r>
-            <a:endParaRPr lang="en-US" dirty="0" smtClean="0"/>
           </a:p>
           <a:p>
             <a:endParaRPr lang="en-US" dirty="0" smtClean="0"/>
@@ -5881,7 +6135,6 @@
               <a:rPr lang="en-US" dirty="0" smtClean="0"/>
               <a:t>Turkey also has its own interface includes 2 different methods</a:t>
             </a:r>
-            <a:endParaRPr lang="en-US" dirty="0" smtClean="0"/>
           </a:p>
           <a:p>
             <a:endParaRPr lang="en-US" dirty="0" smtClean="0"/>
@@ -6082,7 +6335,6 @@
               <a:rPr lang="en-US" dirty="0" smtClean="0"/>
               <a:t>(Duck*) cannot work with Turkey object</a:t>
             </a:r>
-            <a:endParaRPr lang="en-US" dirty="0" smtClean="0"/>
           </a:p>
           <a:p>
             <a:pPr lvl="1"/>

</xml_diff>